<commit_message>
remove lab 01 after solution
</commit_message>
<xml_diff>
--- a/mvc/slides/01_Introduction_To_MVC.pptx
+++ b/mvc/slides/01_Introduction_To_MVC.pptx
@@ -249,7 +249,7 @@
               <a:pPr>
                 <a:defRPr/>
               </a:pPr>
-              <a:t>7/7/2012</a:t>
+              <a:t>8/15/2012</a:t>
             </a:fld>
             <a:endParaRPr lang="en-US"/>
           </a:p>
@@ -4067,14 +4067,14 @@
             </a:r>
           </a:p>
           <a:p>
-            <a:pPr lvl="2"/>
+            <a:pPr lvl="1"/>
             <a:r>
               <a:rPr lang="en-US" dirty="0" smtClean="0"/>
               <a:t>No __VIEWSTATE</a:t>
             </a:r>
           </a:p>
           <a:p>
-            <a:pPr lvl="2"/>
+            <a:pPr lvl="1"/>
             <a:r>
               <a:rPr lang="en-US" dirty="0" smtClean="0"/>
               <a:t>No control state</a:t>
@@ -4095,47 +4095,11 @@
             </a:r>
           </a:p>
           <a:p>
+            <a:pPr lvl="1"/>
             <a:r>
               <a:rPr lang="en-US" dirty="0" smtClean="0"/>
-              <a:t>Strongly typed views</a:t>
-            </a:r>
-          </a:p>
-          <a:p>
-            <a:pPr lvl="1"/>
-            <a:r>
-              <a:rPr lang="en-US" dirty="0" smtClean="0"/>
-              <a:t>Derive from </a:t>
-            </a:r>
-            <a:r>
-              <a:rPr lang="en-US" dirty="0" err="1" smtClean="0"/>
-              <a:t>ViewPage</a:t>
-            </a:r>
-            <a:r>
-              <a:rPr lang="en-US" dirty="0" smtClean="0"/>
-              <a:t>&lt;T&gt; instead of </a:t>
-            </a:r>
-            <a:r>
-              <a:rPr lang="en-US" dirty="0" err="1" smtClean="0"/>
-              <a:t>ViewPage</a:t>
-            </a:r>
-            <a:endParaRPr lang="en-US" dirty="0" smtClean="0"/>
-          </a:p>
-          <a:p>
-            <a:pPr lvl="1"/>
-            <a:r>
-              <a:rPr lang="en-US" dirty="0" smtClean="0"/>
-              <a:t>Use @model directive in Razor</a:t>
-            </a:r>
-          </a:p>
-          <a:p>
-            <a:pPr lvl="1"/>
-            <a:r>
-              <a:rPr lang="en-US" dirty="0" smtClean="0"/>
-              <a:t>Generic type parameter represents the type of the model.</a:t>
-            </a:r>
-          </a:p>
-          <a:p>
-            <a:pPr lvl="1"/>
+              <a:t>Easy to mix HTML and C#</a:t>
+            </a:r>
             <a:endParaRPr lang="en-US" dirty="0" smtClean="0"/>
           </a:p>
           <a:p>
@@ -6930,7 +6894,11 @@
           <a:p>
             <a:r>
               <a:rPr lang="en-US" dirty="0" smtClean="0"/>
-              <a:t>A Brief History of Web Forms</a:t>
+              <a:t>A Brief History of </a:t>
+            </a:r>
+            <a:r>
+              <a:rPr lang="en-US" dirty="0" smtClean="0"/>
+              <a:t>ASP.NET</a:t>
             </a:r>
             <a:endParaRPr lang="en-US" dirty="0"/>
           </a:p>
@@ -6953,7 +6921,11 @@
           <a:p>
             <a:r>
               <a:rPr lang="en-US" dirty="0" smtClean="0"/>
-              <a:t>Replaced classic ASP</a:t>
+              <a:t>ASP.NET replaced </a:t>
+            </a:r>
+            <a:r>
+              <a:rPr lang="en-US" dirty="0" smtClean="0"/>
+              <a:t>classic ASP</a:t>
             </a:r>
           </a:p>
           <a:p>
@@ -7007,7 +6979,11 @@
           <a:p>
             <a:r>
               <a:rPr lang="en-US" dirty="0" smtClean="0"/>
-              <a:t>Web Forms competes against other MVC frameworks</a:t>
+              <a:t>ASP.NET Web </a:t>
+            </a:r>
+            <a:r>
+              <a:rPr lang="en-US" dirty="0" smtClean="0"/>
+              <a:t>Forms competes against other MVC frameworks</a:t>
             </a:r>
           </a:p>
           <a:p>
@@ -7158,13 +7134,8 @@
           <a:p>
             <a:r>
               <a:rPr lang="en-US" dirty="0" smtClean="0"/>
-              <a:t>Still runs on </a:t>
-            </a:r>
-            <a:r>
-              <a:rPr lang="en-US" dirty="0" smtClean="0"/>
-              <a:t>ASP.NET</a:t>
-            </a:r>
-            <a:endParaRPr lang="en-US" dirty="0" smtClean="0"/>
+              <a:t>Still runs on ASP.NET</a:t>
+            </a:r>
           </a:p>
           <a:p>
             <a:pPr lvl="1"/>

</xml_diff>